<commit_message>
Documents update for release
</commit_message>
<xml_diff>
--- a/Documents/External/Theming in Android PhilipsUIKit.pptx
+++ b/Documents/External/Theming in Android PhilipsUIKit.pptx
@@ -239,7 +239,7 @@
           <a:p>
             <a:fld id="{BB2B26BD-11D7-418A-AD97-FD34AF7353EA}" type="datetimeFigureOut">
               <a:rPr lang="en-US" smtClean="0"/>
-              <a:t>2/12/2016</a:t>
+              <a:t>3/14/2016</a:t>
             </a:fld>
             <a:endParaRPr lang="en-US"/>
           </a:p>
@@ -746,7 +746,7 @@
           <a:effectLst/>
           <a:extLst>
             <a:ext uri="{91240B29-F687-4f45-9708-019B960494DF}">
-              <a14:hiddenLine xmlns:a14="http://schemas.microsoft.com/office/drawing/2010/main" xmlns="" w="9525" cap="flat" cmpd="sng" algn="ctr">
+              <a14:hiddenLine xmlns="" xmlns:a14="http://schemas.microsoft.com/office/drawing/2010/main" w="9525" cap="flat" cmpd="sng" algn="ctr">
                 <a:solidFill>
                   <a:schemeClr val="tx1"/>
                 </a:solidFill>
@@ -889,14 +889,14 @@
           <a:effectLst/>
           <a:extLst>
             <a:ext uri="{91240B29-F687-4f45-9708-019B960494DF}">
-              <a14:hiddenLine xmlns:a14="http://schemas.microsoft.com/office/drawing/2010/main" xmlns="" w="0">
+              <a14:hiddenLine xmlns="" xmlns:a14="http://schemas.microsoft.com/office/drawing/2010/main" w="0">
                 <a:solidFill>
                   <a:schemeClr val="tx1"/>
                 </a:solidFill>
               </a14:hiddenLine>
             </a:ext>
             <a:ext uri="{AF507438-7753-43e0-B8FC-AC1667EBCBE1}">
-              <a14:hiddenEffects xmlns:a14="http://schemas.microsoft.com/office/drawing/2010/main" xmlns="">
+              <a14:hiddenEffects xmlns="" xmlns:a14="http://schemas.microsoft.com/office/drawing/2010/main">
                 <a:effectLst>
                   <a:outerShdw blurRad="63500" rotWithShape="0">
                     <a:scrgbClr r="0" g="0" b="0"/>
@@ -905,7 +905,7 @@
               </a14:hiddenEffects>
             </a:ext>
             <a:ext uri="{53640926-AAD7-44d8-BBD7-CCE9431645EC}">
-              <a14:shadowObscured xmlns:a14="http://schemas.microsoft.com/office/drawing/2010/main" xmlns=""/>
+              <a14:shadowObscured xmlns="" xmlns:a14="http://schemas.microsoft.com/office/drawing/2010/main"/>
             </a:ext>
           </a:extLst>
         </p:spPr>
@@ -1229,14 +1229,14 @@
           <a:effectLst/>
           <a:extLst>
             <a:ext uri="{91240B29-F687-4f45-9708-019B960494DF}">
-              <a14:hiddenLine xmlns:a14="http://schemas.microsoft.com/office/drawing/2010/main" xmlns="" w="0">
+              <a14:hiddenLine xmlns="" xmlns:a14="http://schemas.microsoft.com/office/drawing/2010/main" w="0">
                 <a:solidFill>
                   <a:schemeClr val="tx1"/>
                 </a:solidFill>
               </a14:hiddenLine>
             </a:ext>
             <a:ext uri="{AF507438-7753-43e0-B8FC-AC1667EBCBE1}">
-              <a14:hiddenEffects xmlns:a14="http://schemas.microsoft.com/office/drawing/2010/main" xmlns="">
+              <a14:hiddenEffects xmlns="" xmlns:a14="http://schemas.microsoft.com/office/drawing/2010/main">
                 <a:effectLst>
                   <a:outerShdw blurRad="63500" rotWithShape="0">
                     <a:scrgbClr r="0" g="0" b="0"/>
@@ -1245,7 +1245,7 @@
               </a14:hiddenEffects>
             </a:ext>
             <a:ext uri="{53640926-AAD7-44d8-BBD7-CCE9431645EC}">
-              <a14:shadowObscured xmlns:a14="http://schemas.microsoft.com/office/drawing/2010/main" xmlns=""/>
+              <a14:shadowObscured xmlns="" xmlns:a14="http://schemas.microsoft.com/office/drawing/2010/main"/>
             </a:ext>
           </a:extLst>
         </p:spPr>
@@ -1454,14 +1454,14 @@
           <a:effectLst/>
           <a:extLst>
             <a:ext uri="{91240B29-F687-4f45-9708-019B960494DF}">
-              <a14:hiddenLine xmlns:a14="http://schemas.microsoft.com/office/drawing/2010/main" xmlns="" w="0">
+              <a14:hiddenLine xmlns="" xmlns:a14="http://schemas.microsoft.com/office/drawing/2010/main" w="0">
                 <a:solidFill>
                   <a:schemeClr val="tx1"/>
                 </a:solidFill>
               </a14:hiddenLine>
             </a:ext>
             <a:ext uri="{AF507438-7753-43e0-B8FC-AC1667EBCBE1}">
-              <a14:hiddenEffects xmlns:a14="http://schemas.microsoft.com/office/drawing/2010/main" xmlns="">
+              <a14:hiddenEffects xmlns="" xmlns:a14="http://schemas.microsoft.com/office/drawing/2010/main">
                 <a:effectLst>
                   <a:outerShdw blurRad="63500" rotWithShape="0">
                     <a:scrgbClr r="0" g="0" b="0"/>
@@ -1470,7 +1470,7 @@
               </a14:hiddenEffects>
             </a:ext>
             <a:ext uri="{53640926-AAD7-44d8-BBD7-CCE9431645EC}">
-              <a14:shadowObscured xmlns:a14="http://schemas.microsoft.com/office/drawing/2010/main" xmlns=""/>
+              <a14:shadowObscured xmlns="" xmlns:a14="http://schemas.microsoft.com/office/drawing/2010/main"/>
             </a:ext>
           </a:extLst>
         </p:spPr>
@@ -1760,14 +1760,14 @@
           <a:effectLst/>
           <a:extLst>
             <a:ext uri="{91240B29-F687-4f45-9708-019B960494DF}">
-              <a14:hiddenLine xmlns:a14="http://schemas.microsoft.com/office/drawing/2010/main" xmlns="" w="0">
+              <a14:hiddenLine xmlns="" xmlns:a14="http://schemas.microsoft.com/office/drawing/2010/main" w="0">
                 <a:solidFill>
                   <a:schemeClr val="tx1"/>
                 </a:solidFill>
               </a14:hiddenLine>
             </a:ext>
             <a:ext uri="{AF507438-7753-43e0-B8FC-AC1667EBCBE1}">
-              <a14:hiddenEffects xmlns:a14="http://schemas.microsoft.com/office/drawing/2010/main" xmlns="">
+              <a14:hiddenEffects xmlns="" xmlns:a14="http://schemas.microsoft.com/office/drawing/2010/main">
                 <a:effectLst>
                   <a:outerShdw blurRad="63500" rotWithShape="0">
                     <a:scrgbClr r="0" g="0" b="0"/>
@@ -1776,7 +1776,7 @@
               </a14:hiddenEffects>
             </a:ext>
             <a:ext uri="{53640926-AAD7-44d8-BBD7-CCE9431645EC}">
-              <a14:shadowObscured xmlns:a14="http://schemas.microsoft.com/office/drawing/2010/main" xmlns=""/>
+              <a14:shadowObscured xmlns="" xmlns:a14="http://schemas.microsoft.com/office/drawing/2010/main"/>
             </a:ext>
           </a:extLst>
         </p:spPr>
@@ -2075,14 +2075,14 @@
           <a:effectLst/>
           <a:extLst>
             <a:ext uri="{91240B29-F687-4f45-9708-019B960494DF}">
-              <a14:hiddenLine xmlns:a14="http://schemas.microsoft.com/office/drawing/2010/main" xmlns="" w="0">
+              <a14:hiddenLine xmlns="" xmlns:a14="http://schemas.microsoft.com/office/drawing/2010/main" w="0">
                 <a:solidFill>
                   <a:schemeClr val="tx1"/>
                 </a:solidFill>
               </a14:hiddenLine>
             </a:ext>
             <a:ext uri="{AF507438-7753-43e0-B8FC-AC1667EBCBE1}">
-              <a14:hiddenEffects xmlns:a14="http://schemas.microsoft.com/office/drawing/2010/main" xmlns="">
+              <a14:hiddenEffects xmlns="" xmlns:a14="http://schemas.microsoft.com/office/drawing/2010/main">
                 <a:effectLst>
                   <a:outerShdw blurRad="63500" rotWithShape="0">
                     <a:scrgbClr r="0" g="0" b="0"/>
@@ -2091,7 +2091,7 @@
               </a14:hiddenEffects>
             </a:ext>
             <a:ext uri="{53640926-AAD7-44d8-BBD7-CCE9431645EC}">
-              <a14:shadowObscured xmlns:a14="http://schemas.microsoft.com/office/drawing/2010/main" xmlns=""/>
+              <a14:shadowObscured xmlns="" xmlns:a14="http://schemas.microsoft.com/office/drawing/2010/main"/>
             </a:ext>
           </a:extLst>
         </p:spPr>
@@ -2603,14 +2603,14 @@
           <a:effectLst/>
           <a:extLst>
             <a:ext uri="{91240B29-F687-4f45-9708-019B960494DF}">
-              <a14:hiddenLine xmlns:a14="http://schemas.microsoft.com/office/drawing/2010/main" xmlns="" w="0">
+              <a14:hiddenLine xmlns="" xmlns:a14="http://schemas.microsoft.com/office/drawing/2010/main" w="0">
                 <a:solidFill>
                   <a:schemeClr val="tx1"/>
                 </a:solidFill>
               </a14:hiddenLine>
             </a:ext>
             <a:ext uri="{AF507438-7753-43e0-B8FC-AC1667EBCBE1}">
-              <a14:hiddenEffects xmlns:a14="http://schemas.microsoft.com/office/drawing/2010/main" xmlns="">
+              <a14:hiddenEffects xmlns="" xmlns:a14="http://schemas.microsoft.com/office/drawing/2010/main">
                 <a:effectLst>
                   <a:outerShdw blurRad="63500" rotWithShape="0">
                     <a:scrgbClr r="0" g="0" b="0"/>
@@ -2619,7 +2619,7 @@
               </a14:hiddenEffects>
             </a:ext>
             <a:ext uri="{53640926-AAD7-44d8-BBD7-CCE9431645EC}">
-              <a14:shadowObscured xmlns:a14="http://schemas.microsoft.com/office/drawing/2010/main" xmlns=""/>
+              <a14:shadowObscured xmlns="" xmlns:a14="http://schemas.microsoft.com/office/drawing/2010/main"/>
             </a:ext>
           </a:extLst>
         </p:spPr>
@@ -2792,14 +2792,14 @@
           <a:effectLst/>
           <a:extLst>
             <a:ext uri="{91240B29-F687-4f45-9708-019B960494DF}">
-              <a14:hiddenLine xmlns:a14="http://schemas.microsoft.com/office/drawing/2010/main" xmlns="" w="0">
+              <a14:hiddenLine xmlns="" xmlns:a14="http://schemas.microsoft.com/office/drawing/2010/main" w="0">
                 <a:solidFill>
                   <a:schemeClr val="tx1"/>
                 </a:solidFill>
               </a14:hiddenLine>
             </a:ext>
             <a:ext uri="{AF507438-7753-43e0-B8FC-AC1667EBCBE1}">
-              <a14:hiddenEffects xmlns:a14="http://schemas.microsoft.com/office/drawing/2010/main" xmlns="">
+              <a14:hiddenEffects xmlns="" xmlns:a14="http://schemas.microsoft.com/office/drawing/2010/main">
                 <a:effectLst>
                   <a:outerShdw blurRad="63500" rotWithShape="0">
                     <a:scrgbClr r="0" g="0" b="0"/>
@@ -2808,7 +2808,7 @@
               </a14:hiddenEffects>
             </a:ext>
             <a:ext uri="{53640926-AAD7-44d8-BBD7-CCE9431645EC}">
-              <a14:shadowObscured xmlns:a14="http://schemas.microsoft.com/office/drawing/2010/main" xmlns=""/>
+              <a14:shadowObscured xmlns="" xmlns:a14="http://schemas.microsoft.com/office/drawing/2010/main"/>
             </a:ext>
           </a:extLst>
         </p:spPr>
@@ -2998,14 +2998,14 @@
           <a:effectLst/>
           <a:extLst>
             <a:ext uri="{91240B29-F687-4f45-9708-019B960494DF}">
-              <a14:hiddenLine xmlns:a14="http://schemas.microsoft.com/office/drawing/2010/main" xmlns="" w="0">
+              <a14:hiddenLine xmlns="" xmlns:a14="http://schemas.microsoft.com/office/drawing/2010/main" w="0">
                 <a:solidFill>
                   <a:schemeClr val="tx1"/>
                 </a:solidFill>
               </a14:hiddenLine>
             </a:ext>
             <a:ext uri="{AF507438-7753-43e0-B8FC-AC1667EBCBE1}">
-              <a14:hiddenEffects xmlns:a14="http://schemas.microsoft.com/office/drawing/2010/main" xmlns="">
+              <a14:hiddenEffects xmlns="" xmlns:a14="http://schemas.microsoft.com/office/drawing/2010/main">
                 <a:effectLst>
                   <a:outerShdw blurRad="63500" rotWithShape="0">
                     <a:scrgbClr r="0" g="0" b="0"/>
@@ -3014,7 +3014,7 @@
               </a14:hiddenEffects>
             </a:ext>
             <a:ext uri="{53640926-AAD7-44d8-BBD7-CCE9431645EC}">
-              <a14:shadowObscured xmlns:a14="http://schemas.microsoft.com/office/drawing/2010/main" xmlns=""/>
+              <a14:shadowObscured xmlns="" xmlns:a14="http://schemas.microsoft.com/office/drawing/2010/main"/>
             </a:ext>
           </a:extLst>
         </p:spPr>
@@ -3080,14 +3080,14 @@
           <a:effectLst/>
           <a:extLst>
             <a:ext uri="{91240B29-F687-4f45-9708-019B960494DF}">
-              <a14:hiddenLine xmlns:a14="http://schemas.microsoft.com/office/drawing/2010/main" xmlns="" w="0">
+              <a14:hiddenLine xmlns="" xmlns:a14="http://schemas.microsoft.com/office/drawing/2010/main" w="0">
                 <a:solidFill>
                   <a:schemeClr val="tx1"/>
                 </a:solidFill>
               </a14:hiddenLine>
             </a:ext>
             <a:ext uri="{AF507438-7753-43e0-B8FC-AC1667EBCBE1}">
-              <a14:hiddenEffects xmlns:a14="http://schemas.microsoft.com/office/drawing/2010/main" xmlns="">
+              <a14:hiddenEffects xmlns="" xmlns:a14="http://schemas.microsoft.com/office/drawing/2010/main">
                 <a:effectLst>
                   <a:outerShdw blurRad="63500" rotWithShape="0">
                     <a:scrgbClr r="0" g="0" b="0"/>
@@ -3096,7 +3096,7 @@
               </a14:hiddenEffects>
             </a:ext>
             <a:ext uri="{53640926-AAD7-44d8-BBD7-CCE9431645EC}">
-              <a14:shadowObscured xmlns:a14="http://schemas.microsoft.com/office/drawing/2010/main" xmlns=""/>
+              <a14:shadowObscured xmlns="" xmlns:a14="http://schemas.microsoft.com/office/drawing/2010/main"/>
             </a:ext>
           </a:extLst>
         </p:spPr>
@@ -3413,11 +3413,7 @@
           <a:p>
             <a:r>
               <a:rPr lang="en-US" dirty="0" smtClean="0"/>
-              <a:t>Theming </a:t>
-            </a:r>
-            <a:r>
-              <a:rPr lang="en-US" dirty="0" smtClean="0"/>
-              <a:t>in Android </a:t>
+              <a:t>Theming in Android </a:t>
             </a:r>
             <a:r>
               <a:rPr lang="en-US" dirty="0" err="1" smtClean="0"/>
@@ -3551,11 +3547,15 @@
             </a:r>
             <a:r>
               <a:rPr lang="en-US" dirty="0"/>
-              <a:t> name="</a:t>
-            </a:r>
-            <a:r>
-              <a:rPr lang="en-US" dirty="0" err="1"/>
-              <a:t>baseColor</a:t>
+              <a:t> name</a:t>
+            </a:r>
+            <a:r>
+              <a:rPr lang="en-US" dirty="0" smtClean="0"/>
+              <a:t>=“</a:t>
+            </a:r>
+            <a:r>
+              <a:rPr lang="en-US" dirty="0" err="1" smtClean="0"/>
+              <a:t>uikit_baseColor</a:t>
             </a:r>
             <a:r>
               <a:rPr lang="en-US" dirty="0"/>
@@ -3588,11 +3588,15 @@
             </a:r>
             <a:r>
               <a:rPr lang="en-US" dirty="0"/>
-              <a:t> name="</a:t>
-            </a:r>
-            <a:r>
-              <a:rPr lang="en-US" dirty="0" err="1"/>
-              <a:t>verydarkBaseColor</a:t>
+              <a:t> name</a:t>
+            </a:r>
+            <a:r>
+              <a:rPr lang="en-US" dirty="0" smtClean="0"/>
+              <a:t>=“</a:t>
+            </a:r>
+            <a:r>
+              <a:rPr lang="en-US" dirty="0" err="1" smtClean="0"/>
+              <a:t>uikit_verydarkBaseColor</a:t>
             </a:r>
             <a:r>
               <a:rPr lang="en-US" dirty="0"/>
@@ -3621,11 +3625,15 @@
             </a:r>
             <a:r>
               <a:rPr lang="en-US" dirty="0"/>
-              <a:t> name="</a:t>
-            </a:r>
-            <a:r>
-              <a:rPr lang="en-US" dirty="0" err="1"/>
-              <a:t>veryLightColor</a:t>
+              <a:t> name</a:t>
+            </a:r>
+            <a:r>
+              <a:rPr lang="en-US" dirty="0" smtClean="0"/>
+              <a:t>=“</a:t>
+            </a:r>
+            <a:r>
+              <a:rPr lang="en-US" dirty="0" err="1" smtClean="0"/>
+              <a:t>uikit_veryLightColor</a:t>
             </a:r>
             <a:r>
               <a:rPr lang="en-US" dirty="0"/>
@@ -3654,11 +3662,15 @@
             </a:r>
             <a:r>
               <a:rPr lang="en-US" dirty="0"/>
-              <a:t> name="</a:t>
-            </a:r>
-            <a:r>
-              <a:rPr lang="en-US" dirty="0" err="1"/>
-              <a:t>brightColor</a:t>
+              <a:t> name</a:t>
+            </a:r>
+            <a:r>
+              <a:rPr lang="en-US" dirty="0" smtClean="0"/>
+              <a:t>=“</a:t>
+            </a:r>
+            <a:r>
+              <a:rPr lang="en-US" dirty="0" err="1" smtClean="0"/>
+              <a:t>uikit_brightColor</a:t>
             </a:r>
             <a:r>
               <a:rPr lang="en-US" dirty="0"/>
@@ -3683,11 +3695,15 @@
             </a:r>
             <a:r>
               <a:rPr lang="en-US" dirty="0"/>
-              <a:t> name="</a:t>
-            </a:r>
-            <a:r>
-              <a:rPr lang="en-US" dirty="0" err="1"/>
-              <a:t>LightColor</a:t>
+              <a:t> name</a:t>
+            </a:r>
+            <a:r>
+              <a:rPr lang="en-US" dirty="0" smtClean="0"/>
+              <a:t>=“</a:t>
+            </a:r>
+            <a:r>
+              <a:rPr lang="en-US" dirty="0" err="1" smtClean="0"/>
+              <a:t>uikit_LightColor</a:t>
             </a:r>
             <a:r>
               <a:rPr lang="en-US" dirty="0"/>
@@ -3716,11 +3732,15 @@
             </a:r>
             <a:r>
               <a:rPr lang="en-US" dirty="0"/>
-              <a:t> name="</a:t>
-            </a:r>
-            <a:r>
-              <a:rPr lang="en-US" dirty="0" err="1"/>
-              <a:t>darkerColor</a:t>
+              <a:t> name</a:t>
+            </a:r>
+            <a:r>
+              <a:rPr lang="en-US" dirty="0" smtClean="0"/>
+              <a:t>=“</a:t>
+            </a:r>
+            <a:r>
+              <a:rPr lang="en-US" dirty="0" err="1" smtClean="0"/>
+              <a:t>uikit_darkerColor</a:t>
             </a:r>
             <a:r>
               <a:rPr lang="en-US" dirty="0"/>
@@ -3749,11 +3769,15 @@
             </a:r>
             <a:r>
               <a:rPr lang="en-US" dirty="0"/>
-              <a:t> name="</a:t>
-            </a:r>
-            <a:r>
-              <a:rPr lang="en-US" dirty="0" err="1"/>
-              <a:t>gradWindowBackground</a:t>
+              <a:t> name</a:t>
+            </a:r>
+            <a:r>
+              <a:rPr lang="en-US" dirty="0" smtClean="0"/>
+              <a:t>=“</a:t>
+            </a:r>
+            <a:r>
+              <a:rPr lang="en-US" dirty="0" err="1" smtClean="0"/>
+              <a:t>uikit_gradWindowBackground</a:t>
             </a:r>
             <a:r>
               <a:rPr lang="en-US" dirty="0"/>
@@ -3792,11 +3816,15 @@
             </a:r>
             <a:r>
               <a:rPr lang="en-US" dirty="0"/>
-              <a:t> name="</a:t>
-            </a:r>
-            <a:r>
-              <a:rPr lang="en-US" dirty="0" err="1"/>
-              <a:t>baseGradient</a:t>
+              <a:t> name</a:t>
+            </a:r>
+            <a:r>
+              <a:rPr lang="en-US" dirty="0" smtClean="0"/>
+              <a:t>=“</a:t>
+            </a:r>
+            <a:r>
+              <a:rPr lang="en-US" dirty="0" err="1" smtClean="0"/>
+              <a:t>uikit_baseGradient</a:t>
             </a:r>
             <a:r>
               <a:rPr lang="en-US" dirty="0"/>
@@ -3821,11 +3849,15 @@
             </a:r>
             <a:r>
               <a:rPr lang="en-US" dirty="0"/>
-              <a:t> name="</a:t>
-            </a:r>
-            <a:r>
-              <a:rPr lang="en-US" dirty="0" err="1"/>
-              <a:t>darkerGradient</a:t>
+              <a:t> name</a:t>
+            </a:r>
+            <a:r>
+              <a:rPr lang="en-US" dirty="0" smtClean="0"/>
+              <a:t>=“</a:t>
+            </a:r>
+            <a:r>
+              <a:rPr lang="en-US" dirty="0" err="1" smtClean="0"/>
+              <a:t>uikit_darkerGradient</a:t>
             </a:r>
             <a:r>
               <a:rPr lang="en-US" dirty="0"/>
@@ -3850,11 +3882,15 @@
             </a:r>
             <a:r>
               <a:rPr lang="en-US" dirty="0"/>
-              <a:t> name="</a:t>
-            </a:r>
-            <a:r>
-              <a:rPr lang="en-US" dirty="0" err="1"/>
-              <a:t>lighterGradient</a:t>
+              <a:t> name</a:t>
+            </a:r>
+            <a:r>
+              <a:rPr lang="en-US" dirty="0" smtClean="0"/>
+              <a:t>=“</a:t>
+            </a:r>
+            <a:r>
+              <a:rPr lang="en-US" dirty="0" err="1" smtClean="0"/>
+              <a:t>uikit_lighterGradient</a:t>
             </a:r>
             <a:r>
               <a:rPr lang="en-US" dirty="0"/>
@@ -3879,11 +3915,15 @@
             </a:r>
             <a:r>
               <a:rPr lang="en-US" dirty="0"/>
-              <a:t> name="</a:t>
-            </a:r>
-            <a:r>
-              <a:rPr lang="en-US" dirty="0" err="1"/>
-              <a:t>evenLighterGradient</a:t>
+              <a:t> name</a:t>
+            </a:r>
+            <a:r>
+              <a:rPr lang="en-US" dirty="0" smtClean="0"/>
+              <a:t>=“</a:t>
+            </a:r>
+            <a:r>
+              <a:rPr lang="en-US" dirty="0" err="1" smtClean="0"/>
+              <a:t>uikit_evenLighterGradient</a:t>
             </a:r>
             <a:r>
               <a:rPr lang="en-US" dirty="0"/>
@@ -3908,17 +3948,20 @@
             </a:r>
             <a:r>
               <a:rPr lang="en-US" dirty="0"/>
-              <a:t> name="</a:t>
-            </a:r>
-            <a:r>
-              <a:rPr lang="en-US" dirty="0" err="1"/>
-              <a:t>veryLightGradient</a:t>
+              <a:t> name</a:t>
+            </a:r>
+            <a:r>
+              <a:rPr lang="en-US" dirty="0" smtClean="0"/>
+              <a:t>=“</a:t>
+            </a:r>
+            <a:r>
+              <a:rPr lang="en-US" dirty="0" err="1" smtClean="0"/>
+              <a:t>uikit_veryLightGradient</a:t>
             </a:r>
             <a:r>
               <a:rPr lang="en-US" dirty="0"/>
               <a:t>" format="reference"/&gt;</a:t>
             </a:r>
-            <a:endParaRPr lang="en-US" dirty="0"/>
           </a:p>
         </p:txBody>
       </p:sp>
@@ -4344,7 +4387,7 @@
               <a:t>="?</a:t>
             </a:r>
             <a:r>
-              <a:rPr lang="en-US" sz="1400" dirty="0" err="1">
+              <a:rPr lang="en-US" sz="1400" dirty="0" err="1" smtClean="0">
                 <a:solidFill>
                   <a:srgbClr val="FF0000"/>
                 </a:solidFill>
@@ -4354,7 +4397,7 @@
               <a:t>attr</a:t>
             </a:r>
             <a:r>
-              <a:rPr lang="en-US" sz="1400" dirty="0">
+              <a:rPr lang="en-US" sz="1400" dirty="0" smtClean="0">
                 <a:solidFill>
                   <a:srgbClr val="FF0000"/>
                 </a:solidFill>
@@ -4364,14 +4407,14 @@
               <a:t>/</a:t>
             </a:r>
             <a:r>
-              <a:rPr lang="en-US" sz="1400" dirty="0" err="1">
+              <a:rPr lang="en-US" sz="1400" dirty="0" err="1" smtClean="0">
                 <a:solidFill>
                   <a:srgbClr val="FF0000"/>
                 </a:solidFill>
                 <a:latin typeface="Monaco"/>
                 <a:cs typeface="Monaco"/>
               </a:rPr>
-              <a:t>darkerColor</a:t>
+              <a:t>uikit_darkerColor</a:t>
             </a:r>
             <a:r>
               <a:rPr lang="en-US" sz="1400" dirty="0">
@@ -4418,13 +4461,6 @@
               </a:rPr>
               <a:t>="16sp" /&gt;</a:t>
             </a:r>
-            <a:endParaRPr lang="en-US" sz="1400" dirty="0">
-              <a:solidFill>
-                <a:srgbClr val="0089C4"/>
-              </a:solidFill>
-              <a:latin typeface="Monaco"/>
-              <a:cs typeface="Monaco"/>
-            </a:endParaRPr>
           </a:p>
         </p:txBody>
       </p:sp>
@@ -11311,18 +11347,18 @@
 </file>
 
 <file path=customXml/item2.xml><?xml version="1.0" encoding="utf-8"?>
+<p:properties xmlns:p="http://schemas.microsoft.com/office/2006/metadata/properties" xmlns:xsi="http://www.w3.org/2001/XMLSchema-instance" xmlns:pc="http://schemas.microsoft.com/office/infopath/2007/PartnerControls">
+  <documentManagement/>
+</p:properties>
+</file>
+
+<file path=customXml/item3.xml><?xml version="1.0" encoding="utf-8"?>
 <?mso-contentType ?>
 <FormTemplates xmlns="http://schemas.microsoft.com/sharepoint/v3/contenttype/forms">
   <Display>DocumentLibraryForm</Display>
   <Edit>DocumentLibraryForm</Edit>
   <New>DocumentLibraryForm</New>
 </FormTemplates>
-</file>
-
-<file path=customXml/item3.xml><?xml version="1.0" encoding="utf-8"?>
-<p:properties xmlns:p="http://schemas.microsoft.com/office/2006/metadata/properties" xmlns:xsi="http://www.w3.org/2001/XMLSchema-instance" xmlns:pc="http://schemas.microsoft.com/office/infopath/2007/PartnerControls">
-  <documentManagement/>
-</p:properties>
 </file>
 
 <file path=customXml/itemProps1.xml><?xml version="1.0" encoding="utf-8"?>
@@ -11342,18 +11378,18 @@
 </file>
 
 <file path=customXml/itemProps2.xml><?xml version="1.0" encoding="utf-8"?>
-<ds:datastoreItem xmlns:ds="http://schemas.openxmlformats.org/officeDocument/2006/customXml" ds:itemID="{42FAAB06-E9F2-4B6B-AAC2-B6E4A2F5E66A}">
-  <ds:schemaRefs>
-    <ds:schemaRef ds:uri="http://schemas.microsoft.com/sharepoint/v3/contenttype/forms"/>
-  </ds:schemaRefs>
-</ds:datastoreItem>
-</file>
-
-<file path=customXml/itemProps3.xml><?xml version="1.0" encoding="utf-8"?>
 <ds:datastoreItem xmlns:ds="http://schemas.openxmlformats.org/officeDocument/2006/customXml" ds:itemID="{6DB1FA41-9EDD-4276-AB17-95E8CCF7F43E}">
   <ds:schemaRefs>
     <ds:schemaRef ds:uri="http://schemas.microsoft.com/office/2006/metadata/properties"/>
     <ds:schemaRef ds:uri="http://schemas.microsoft.com/office/infopath/2007/PartnerControls"/>
   </ds:schemaRefs>
 </ds:datastoreItem>
+</file>
+
+<file path=customXml/itemProps3.xml><?xml version="1.0" encoding="utf-8"?>
+<ds:datastoreItem xmlns:ds="http://schemas.openxmlformats.org/officeDocument/2006/customXml" ds:itemID="{42FAAB06-E9F2-4B6B-AAC2-B6E4A2F5E66A}">
+  <ds:schemaRefs>
+    <ds:schemaRef ds:uri="http://schemas.microsoft.com/sharepoint/v3/contenttype/forms"/>
+  </ds:schemaRefs>
+</ds:datastoreItem>
 </file>
</xml_diff>